<commit_message>
Update powerpoint golden tests:
Some internal changes in templating produced slightly different
xml. All have been checked, are not corrupt, and have output as expected.
</commit_message>
<xml_diff>
--- a/test/pptx/endnotes_toc_templated.pptx
+++ b/test/pptx/endnotes_toc_templated.pptx
@@ -5728,7 +5728,7 @@
       </p:grpSpPr>
       <p:sp>
         <p:nvSpPr>
-          <p:cNvPr id="2" name="Title 1"/>
+          <p:cNvPr id="8" name="Title 1"/>
           <p:cNvSpPr>
             <a:spLocks noGrp="1"/>
           </p:cNvSpPr>
@@ -5863,7 +5863,7 @@
       </p:grpSpPr>
       <p:sp>
         <p:nvSpPr>
-          <p:cNvPr id="2" name="Title 1"/>
+          <p:cNvPr id="8" name="Title 1"/>
           <p:cNvSpPr>
             <a:spLocks noGrp="1"/>
           </p:cNvSpPr>

</xml_diff>